<commit_message>
added s5 and updated s1-4
</commit_message>
<xml_diff>
--- a/scenario1/recording/T101389-Scenario1-v20210921.pptx
+++ b/scenario1/recording/T101389-Scenario1-v20210921.pptx
@@ -213,7 +213,7 @@
           <a:p>
             <a:fld id="{39C8D823-5070-4303-893E-3EE68598E0B1}" type="datetimeFigureOut">
               <a:rPr lang="en-US" smtClean="0"/>
-              <a:t>9/21/2021</a:t>
+              <a:t>9/22/2021</a:t>
             </a:fld>
             <a:endParaRPr lang="en-US"/>
           </a:p>
@@ -1047,7 +1047,7 @@
           <a:p>
             <a:fld id="{48FC2B21-7E56-4657-8153-3102D269B655}" type="datetimeFigureOut">
               <a:rPr lang="en-US" smtClean="0"/>
-              <a:t>9/21/2021</a:t>
+              <a:t>9/22/2021</a:t>
             </a:fld>
             <a:endParaRPr lang="en-US"/>
           </a:p>
@@ -1245,7 +1245,7 @@
           <a:p>
             <a:fld id="{48FC2B21-7E56-4657-8153-3102D269B655}" type="datetimeFigureOut">
               <a:rPr lang="en-US" smtClean="0"/>
-              <a:t>9/21/2021</a:t>
+              <a:t>9/22/2021</a:t>
             </a:fld>
             <a:endParaRPr lang="en-US"/>
           </a:p>
@@ -1453,7 +1453,7 @@
           <a:p>
             <a:fld id="{48FC2B21-7E56-4657-8153-3102D269B655}" type="datetimeFigureOut">
               <a:rPr lang="en-US" smtClean="0"/>
-              <a:t>9/21/2021</a:t>
+              <a:t>9/22/2021</a:t>
             </a:fld>
             <a:endParaRPr lang="en-US"/>
           </a:p>
@@ -1651,7 +1651,7 @@
           <a:p>
             <a:fld id="{48FC2B21-7E56-4657-8153-3102D269B655}" type="datetimeFigureOut">
               <a:rPr lang="en-US" smtClean="0"/>
-              <a:t>9/21/2021</a:t>
+              <a:t>9/22/2021</a:t>
             </a:fld>
             <a:endParaRPr lang="en-US"/>
           </a:p>
@@ -1926,7 +1926,7 @@
           <a:p>
             <a:fld id="{48FC2B21-7E56-4657-8153-3102D269B655}" type="datetimeFigureOut">
               <a:rPr lang="en-US" smtClean="0"/>
-              <a:t>9/21/2021</a:t>
+              <a:t>9/22/2021</a:t>
             </a:fld>
             <a:endParaRPr lang="en-US"/>
           </a:p>
@@ -2191,7 +2191,7 @@
           <a:p>
             <a:fld id="{48FC2B21-7E56-4657-8153-3102D269B655}" type="datetimeFigureOut">
               <a:rPr lang="en-US" smtClean="0"/>
-              <a:t>9/21/2021</a:t>
+              <a:t>9/22/2021</a:t>
             </a:fld>
             <a:endParaRPr lang="en-US"/>
           </a:p>
@@ -2603,7 +2603,7 @@
           <a:p>
             <a:fld id="{48FC2B21-7E56-4657-8153-3102D269B655}" type="datetimeFigureOut">
               <a:rPr lang="en-US" smtClean="0"/>
-              <a:t>9/21/2021</a:t>
+              <a:t>9/22/2021</a:t>
             </a:fld>
             <a:endParaRPr lang="en-US"/>
           </a:p>
@@ -2744,7 +2744,7 @@
           <a:p>
             <a:fld id="{48FC2B21-7E56-4657-8153-3102D269B655}" type="datetimeFigureOut">
               <a:rPr lang="en-US" smtClean="0"/>
-              <a:t>9/21/2021</a:t>
+              <a:t>9/22/2021</a:t>
             </a:fld>
             <a:endParaRPr lang="en-US"/>
           </a:p>
@@ -2857,7 +2857,7 @@
           <a:p>
             <a:fld id="{48FC2B21-7E56-4657-8153-3102D269B655}" type="datetimeFigureOut">
               <a:rPr lang="en-US" smtClean="0"/>
-              <a:t>9/21/2021</a:t>
+              <a:t>9/22/2021</a:t>
             </a:fld>
             <a:endParaRPr lang="en-US"/>
           </a:p>
@@ -3168,7 +3168,7 @@
           <a:p>
             <a:fld id="{48FC2B21-7E56-4657-8153-3102D269B655}" type="datetimeFigureOut">
               <a:rPr lang="en-US" smtClean="0"/>
-              <a:t>9/21/2021</a:t>
+              <a:t>9/22/2021</a:t>
             </a:fld>
             <a:endParaRPr lang="en-US"/>
           </a:p>
@@ -3456,7 +3456,7 @@
           <a:p>
             <a:fld id="{48FC2B21-7E56-4657-8153-3102D269B655}" type="datetimeFigureOut">
               <a:rPr lang="en-US" smtClean="0"/>
-              <a:t>9/21/2021</a:t>
+              <a:t>9/22/2021</a:t>
             </a:fld>
             <a:endParaRPr lang="en-US"/>
           </a:p>
@@ -3697,7 +3697,7 @@
           <a:p>
             <a:fld id="{48FC2B21-7E56-4657-8153-3102D269B655}" type="datetimeFigureOut">
               <a:rPr lang="en-US" smtClean="0"/>
-              <a:t>9/21/2021</a:t>
+              <a:t>9/22/2021</a:t>
             </a:fld>
             <a:endParaRPr lang="en-US"/>
           </a:p>
@@ -4150,7 +4150,7 @@
                 <a:effectLst/>
                 <a:latin typeface="-apple-system"/>
               </a:rPr>
-              <a:t>Demo: Unified Data Catalog for Military Aircraft</a:t>
+              <a:t>Demo: Unified Data Catalog for Aircraft Images</a:t>
             </a:r>
             <a:endParaRPr lang="en-US" sz="4000" dirty="0"/>
           </a:p>
@@ -4819,7 +4819,7 @@
                 </a:solidFill>
                 <a:latin typeface="-apple-system"/>
               </a:rPr>
-              <a:t>Find the Newly Tagged Dataset with Visual Query</a:t>
+              <a:t>Browse for New Dataset (udc-dem2 = T101389-s1) with Visual Query</a:t>
             </a:r>
             <a:endParaRPr lang="en-US" sz="1400" dirty="0">
               <a:solidFill>
@@ -5174,12 +5174,59 @@
           <a:chExt cx="0" cy="0"/>
         </a:xfrm>
       </p:grpSpPr>
+      <p:sp>
+        <p:nvSpPr>
+          <p:cNvPr id="6" name="TextBox 5">
+            <a:extLst>
+              <a:ext uri="{FF2B5EF4-FFF2-40B4-BE49-F238E27FC236}">
+                <a16:creationId xmlns:a16="http://schemas.microsoft.com/office/drawing/2014/main" id="{7A88B84A-7FB5-4C14-8855-A10017599D03}"/>
+              </a:ext>
+            </a:extLst>
+          </p:cNvPr>
+          <p:cNvSpPr txBox="1"/>
+          <p:nvPr/>
+        </p:nvSpPr>
+        <p:spPr>
+          <a:xfrm>
+            <a:off x="0" y="-12367"/>
+            <a:ext cx="12192000" cy="307777"/>
+          </a:xfrm>
+          <a:prstGeom prst="rect">
+            <a:avLst/>
+          </a:prstGeom>
+          <a:solidFill>
+            <a:schemeClr val="tx1"/>
+          </a:solidFill>
+        </p:spPr>
+        <p:txBody>
+          <a:bodyPr wrap="square">
+            <a:spAutoFit/>
+          </a:bodyPr>
+          <a:lstStyle/>
+          <a:p>
+            <a:r>
+              <a:rPr lang="en-US" sz="1400" b="1" dirty="0">
+                <a:solidFill>
+                  <a:schemeClr val="bg1"/>
+                </a:solidFill>
+                <a:latin typeface="-apple-system"/>
+              </a:rPr>
+              <a:t>Generate a Report of the New Dataset as a CSV Manifest</a:t>
+            </a:r>
+            <a:endParaRPr lang="en-US" sz="1400" dirty="0">
+              <a:solidFill>
+                <a:schemeClr val="bg1"/>
+              </a:solidFill>
+            </a:endParaRPr>
+          </a:p>
+        </p:txBody>
+      </p:sp>
       <p:pic>
         <p:nvPicPr>
-          <p:cNvPr id="5" name="Picture 4">
-            <a:extLst>
-              <a:ext uri="{FF2B5EF4-FFF2-40B4-BE49-F238E27FC236}">
-                <a16:creationId xmlns:a16="http://schemas.microsoft.com/office/drawing/2014/main" id="{42C2171D-13DC-424C-B785-42F6A39C5321}"/>
+          <p:cNvPr id="3" name="Picture 2">
+            <a:extLst>
+              <a:ext uri="{FF2B5EF4-FFF2-40B4-BE49-F238E27FC236}">
+                <a16:creationId xmlns:a16="http://schemas.microsoft.com/office/drawing/2014/main" id="{9045C729-9815-45D4-847A-135F2DCEDEED}"/>
               </a:ext>
             </a:extLst>
           </p:cNvPr>
@@ -5196,61 +5243,14 @@
         </p:blipFill>
         <p:spPr>
           <a:xfrm>
-            <a:off x="0" y="808726"/>
-            <a:ext cx="12192000" cy="5240547"/>
+            <a:off x="0" y="687750"/>
+            <a:ext cx="12192000" cy="5482499"/>
           </a:xfrm>
           <a:prstGeom prst="rect">
             <a:avLst/>
           </a:prstGeom>
         </p:spPr>
       </p:pic>
-      <p:sp>
-        <p:nvSpPr>
-          <p:cNvPr id="6" name="TextBox 5">
-            <a:extLst>
-              <a:ext uri="{FF2B5EF4-FFF2-40B4-BE49-F238E27FC236}">
-                <a16:creationId xmlns:a16="http://schemas.microsoft.com/office/drawing/2014/main" id="{7A88B84A-7FB5-4C14-8855-A10017599D03}"/>
-              </a:ext>
-            </a:extLst>
-          </p:cNvPr>
-          <p:cNvSpPr txBox="1"/>
-          <p:nvPr/>
-        </p:nvSpPr>
-        <p:spPr>
-          <a:xfrm>
-            <a:off x="0" y="-12367"/>
-            <a:ext cx="12192000" cy="307777"/>
-          </a:xfrm>
-          <a:prstGeom prst="rect">
-            <a:avLst/>
-          </a:prstGeom>
-          <a:solidFill>
-            <a:schemeClr val="tx1"/>
-          </a:solidFill>
-        </p:spPr>
-        <p:txBody>
-          <a:bodyPr wrap="square">
-            <a:spAutoFit/>
-          </a:bodyPr>
-          <a:lstStyle/>
-          <a:p>
-            <a:r>
-              <a:rPr lang="en-US" sz="1400" b="1" dirty="0">
-                <a:solidFill>
-                  <a:schemeClr val="bg1"/>
-                </a:solidFill>
-                <a:latin typeface="-apple-system"/>
-              </a:rPr>
-              <a:t>Export the New Dataset into a Manifest</a:t>
-            </a:r>
-            <a:endParaRPr lang="en-US" sz="1400" dirty="0">
-              <a:solidFill>
-                <a:schemeClr val="bg1"/>
-              </a:solidFill>
-            </a:endParaRPr>
-          </a:p>
-        </p:txBody>
-      </p:sp>
     </p:spTree>
     <p:extLst>
       <p:ext uri="{BB962C8B-B14F-4D97-AF65-F5344CB8AC3E}">
@@ -5425,7 +5425,7 @@
                 </a:solidFill>
                 <a:latin typeface="-apple-system"/>
               </a:rPr>
-              <a:t>Export the New Dataset into a Manifest</a:t>
+              <a:t>The Manifest is Stored in Console as Report</a:t>
             </a:r>
             <a:endParaRPr lang="en-US" sz="1400" dirty="0">
               <a:solidFill>
@@ -5584,7 +5584,16 @@
                 </a:solidFill>
                 <a:latin typeface="-apple-system"/>
               </a:rPr>
-              <a:t>Export the New Dataset into a Manifest</a:t>
+              <a:t>Manifest Can be </a:t>
+            </a:r>
+            <a:r>
+              <a:rPr lang="en-US" sz="1400" b="1">
+                <a:solidFill>
+                  <a:schemeClr val="bg1"/>
+                </a:solidFill>
+                <a:latin typeface="-apple-system"/>
+              </a:rPr>
+              <a:t>Downloaded Locally as CSV File</a:t>
             </a:r>
             <a:endParaRPr lang="en-US" sz="1400" dirty="0">
               <a:solidFill>
@@ -5844,7 +5853,7 @@
                 <a:effectLst/>
                 <a:latin typeface="-apple-system"/>
               </a:rPr>
-              <a:t>Search for Dataset using Query Builder</a:t>
+              <a:t>Search for Dataset using SQL Query from Query Builder</a:t>
             </a:r>
             <a:endParaRPr lang="en-US" sz="1400" dirty="0">
               <a:solidFill>
@@ -5988,7 +5997,7 @@
         </p:blipFill>
         <p:spPr>
           <a:xfrm>
-            <a:off x="0" y="618585"/>
+            <a:off x="0" y="628110"/>
             <a:ext cx="12192000" cy="6092169"/>
           </a:xfrm>
           <a:prstGeom prst="rect">
@@ -6034,7 +6043,7 @@
                 <a:effectLst/>
                 <a:latin typeface="-apple-system"/>
               </a:rPr>
-              <a:t>Search for Dataset using Query Builder: Results</a:t>
+              <a:t>Query Results Displayed</a:t>
             </a:r>
             <a:endParaRPr lang="en-US" sz="1400" dirty="0">
               <a:solidFill>
@@ -6341,16 +6350,6 @@
           <a:lstStyle/>
           <a:p>
             <a:r>
-              <a:rPr lang="en-US" sz="1400" b="1" i="0" dirty="0">
-                <a:solidFill>
-                  <a:schemeClr val="bg1"/>
-                </a:solidFill>
-                <a:effectLst/>
-                <a:latin typeface="-apple-system"/>
-              </a:rPr>
-              <a:t>Create </a:t>
-            </a:r>
-            <a:r>
               <a:rPr lang="en-US" sz="1400" b="1" i="0" dirty="0" err="1">
                 <a:solidFill>
                   <a:schemeClr val="bg1"/>
@@ -6368,7 +6367,7 @@
                 <a:effectLst/>
                 <a:latin typeface="-apple-system"/>
               </a:rPr>
-              <a:t> Policy: Result</a:t>
+              <a:t> Policy Added to Spectrum Discover Console</a:t>
             </a:r>
             <a:endParaRPr lang="en-US" sz="1400" dirty="0">
               <a:solidFill>
@@ -6551,34 +6550,31 @@
           <a:lstStyle/>
           <a:p>
             <a:r>
-              <a:rPr lang="en-US" sz="1400" b="1" i="0" dirty="0">
+              <a:rPr lang="en-US" sz="1400" b="1" dirty="0">
                 <a:solidFill>
                   <a:schemeClr val="bg1"/>
                 </a:solidFill>
-                <a:effectLst/>
                 <a:latin typeface="-apple-system"/>
               </a:rPr>
-              <a:t>Create </a:t>
-            </a:r>
-            <a:r>
-              <a:rPr lang="en-US" sz="1400" b="1" i="0" dirty="0" err="1">
+              <a:t>Newly Created </a:t>
+            </a:r>
+            <a:r>
+              <a:rPr lang="en-US" sz="1400" b="1" dirty="0" err="1">
                 <a:solidFill>
                   <a:schemeClr val="bg1"/>
                 </a:solidFill>
-                <a:effectLst/>
                 <a:latin typeface="-apple-system"/>
               </a:rPr>
               <a:t>AutoTag</a:t>
             </a:r>
             <a:r>
-              <a:rPr lang="en-US" sz="1400" b="1" i="0" dirty="0">
+              <a:rPr lang="en-US" sz="1400" b="1" dirty="0">
                 <a:solidFill>
                   <a:schemeClr val="bg1"/>
                 </a:solidFill>
-                <a:effectLst/>
                 <a:latin typeface="-apple-system"/>
               </a:rPr>
-              <a:t> Policy: Result</a:t>
+              <a:t> Policy Executed Automatically for First Time</a:t>
             </a:r>
             <a:endParaRPr lang="en-US" sz="1400" dirty="0">
               <a:solidFill>
@@ -6701,34 +6697,31 @@
           <a:lstStyle/>
           <a:p>
             <a:r>
-              <a:rPr lang="en-US" sz="1400" b="1" i="0" dirty="0">
+              <a:rPr lang="en-US" sz="1400" b="1" dirty="0">
                 <a:solidFill>
                   <a:schemeClr val="bg1"/>
                 </a:solidFill>
-                <a:effectLst/>
                 <a:latin typeface="-apple-system"/>
               </a:rPr>
-              <a:t>Create </a:t>
-            </a:r>
-            <a:r>
-              <a:rPr lang="en-US" sz="1400" b="1" i="0" dirty="0" err="1">
+              <a:t>Metadata Tag “u2-source” Populated with Values Extracted by </a:t>
+            </a:r>
+            <a:r>
+              <a:rPr lang="en-US" sz="1400" b="1" dirty="0" err="1">
                 <a:solidFill>
                   <a:schemeClr val="bg1"/>
                 </a:solidFill>
-                <a:effectLst/>
                 <a:latin typeface="-apple-system"/>
               </a:rPr>
               <a:t>AutoTag</a:t>
             </a:r>
             <a:r>
-              <a:rPr lang="en-US" sz="1400" b="1" i="0" dirty="0">
+              <a:rPr lang="en-US" sz="1400" b="1" dirty="0">
                 <a:solidFill>
                   <a:schemeClr val="bg1"/>
                 </a:solidFill>
-                <a:effectLst/>
                 <a:latin typeface="-apple-system"/>
               </a:rPr>
-              <a:t> Policy: Result</a:t>
+              <a:t> Policy Run</a:t>
             </a:r>
             <a:endParaRPr lang="en-US" sz="1400" dirty="0">
               <a:solidFill>

</xml_diff>